<commit_message>
New javadoc, fixed some comments
Jon Sun
</commit_message>
<xml_diff>
--- a/presentation/Team MIDI-Pop.pptx
+++ b/presentation/Team MIDI-Pop.pptx
@@ -4822,68 +4822,8 @@
                 </a:effectLst>
                 <a:latin typeface="Century Gothic" pitchFamily="34" charset="0"/>
               </a:rPr>
-              <a:t>“</a:t>
-            </a:r>
-            <a:r>
-              <a:rPr lang="en-US" sz="4400" b="1" dirty="0" err="1" smtClean="0">
-                <a:ln w="19050">
-                  <a:solidFill>
-                    <a:srgbClr val="92D050"/>
-                  </a:solidFill>
-                  <a:prstDash val="solid"/>
-                  <a:miter lim="800000"/>
-                </a:ln>
-                <a:noFill/>
-                <a:effectLst>
-                  <a:outerShdw blurRad="25500" dist="23000" dir="7020000" algn="tl">
-                    <a:srgbClr val="000000">
-                      <a:alpha val="50000"/>
-                    </a:srgbClr>
-                  </a:outerShdw>
-                </a:effectLst>
-                <a:latin typeface="Century Gothic" pitchFamily="34" charset="0"/>
-              </a:rPr>
-              <a:t>SS12_AudioPreview</a:t>
-            </a:r>
-            <a:r>
-              <a:rPr lang="en-US" sz="4400" b="1" dirty="0" smtClean="0">
-                <a:ln w="19050">
-                  <a:solidFill>
-                    <a:srgbClr val="92D050"/>
-                  </a:solidFill>
-                  <a:prstDash val="solid"/>
-                  <a:miter lim="800000"/>
-                </a:ln>
-                <a:noFill/>
-                <a:effectLst>
-                  <a:outerShdw blurRad="25500" dist="23000" dir="7020000" algn="tl">
-                    <a:srgbClr val="000000">
-                      <a:alpha val="50000"/>
-                    </a:srgbClr>
-                  </a:outerShdw>
-                </a:effectLst>
-                <a:latin typeface="Century Gothic" pitchFamily="34" charset="0"/>
-              </a:rPr>
-              <a:t> [trunk]”</a:t>
-            </a:r>
-            <a:endParaRPr lang="en-US" sz="4400" b="1" dirty="0" smtClean="0">
-              <a:ln w="19050">
-                <a:solidFill>
-                  <a:srgbClr val="92D050"/>
-                </a:solidFill>
-                <a:prstDash val="solid"/>
-                <a:miter lim="800000"/>
-              </a:ln>
-              <a:noFill/>
-              <a:effectLst>
-                <a:outerShdw blurRad="25500" dist="23000" dir="7020000" algn="tl">
-                  <a:srgbClr val="000000">
-                    <a:alpha val="50000"/>
-                  </a:srgbClr>
-                </a:outerShdw>
-              </a:effectLst>
-              <a:latin typeface="Century Gothic" pitchFamily="34" charset="0"/>
-            </a:endParaRPr>
+              <a:t>“SS12_AudioPreview [trunk]”</a:t>
+            </a:r>
           </a:p>
         </p:txBody>
       </p:sp>
@@ -4929,8 +4869,31 @@
           <a:p>
             <a:r>
               <a:rPr lang="en-US" sz="3200" dirty="0" smtClean="0"/>
-              <a:t>Number of tree conflicts: …</a:t>
-            </a:r>
+              <a:t>Number of tree conflicts: </a:t>
+            </a:r>
+            <a:r>
+              <a:rPr lang="en-US" sz="3200" dirty="0" smtClean="0"/>
+              <a:t>…</a:t>
+            </a:r>
+          </a:p>
+          <a:p>
+            <a:r>
+              <a:rPr lang="en-US" sz="3200" dirty="0" smtClean="0"/>
+              <a:t>URL: </a:t>
+            </a:r>
+            <a:r>
+              <a:rPr lang="en-US" sz="3200" dirty="0" smtClean="0">
+                <a:hlinkClick r:id="rId2"/>
+              </a:rPr>
+              <a:t>http://code.google.com/p/ss12-usc-2011-audiopreview2</a:t>
+            </a:r>
+            <a:r>
+              <a:rPr lang="en-US" sz="3200" dirty="0" smtClean="0">
+                <a:hlinkClick r:id="rId2"/>
+              </a:rPr>
+              <a:t>/</a:t>
+            </a:r>
+            <a:endParaRPr lang="en-US" sz="3200" dirty="0" smtClean="0"/>
           </a:p>
           <a:p>
             <a:endParaRPr lang="en-US" sz="3200" dirty="0"/>

</xml_diff>

<commit_message>
renamed sounds changed powerpoint
Jon Sun
</commit_message>
<xml_diff>
--- a/presentation/Team MIDI-Pop.pptx
+++ b/presentation/Team MIDI-Pop.pptx
@@ -497,7 +497,7 @@
             <a:fld id="{DA4A45B6-BEFB-425B-8601-225B4CBA19A0}" type="datetimeFigureOut">
               <a:rPr lang="en-US" smtClean="0"/>
               <a:pPr/>
-              <a:t>2/19/2011</a:t>
+              <a:t>2/20/2011</a:t>
             </a:fld>
             <a:endParaRPr lang="en-US"/>
           </a:p>
@@ -667,7 +667,7 @@
             <a:fld id="{DA4A45B6-BEFB-425B-8601-225B4CBA19A0}" type="datetimeFigureOut">
               <a:rPr lang="en-US" smtClean="0"/>
               <a:pPr/>
-              <a:t>2/19/2011</a:t>
+              <a:t>2/20/2011</a:t>
             </a:fld>
             <a:endParaRPr lang="en-US"/>
           </a:p>
@@ -847,7 +847,7 @@
             <a:fld id="{DA4A45B6-BEFB-425B-8601-225B4CBA19A0}" type="datetimeFigureOut">
               <a:rPr lang="en-US" smtClean="0"/>
               <a:pPr/>
-              <a:t>2/19/2011</a:t>
+              <a:t>2/20/2011</a:t>
             </a:fld>
             <a:endParaRPr lang="en-US"/>
           </a:p>
@@ -1021,7 +1021,7 @@
             <a:fld id="{DA4A45B6-BEFB-425B-8601-225B4CBA19A0}" type="datetimeFigureOut">
               <a:rPr lang="en-US" smtClean="0"/>
               <a:pPr/>
-              <a:t>2/19/2011</a:t>
+              <a:t>2/20/2011</a:t>
             </a:fld>
             <a:endParaRPr lang="en-US"/>
           </a:p>
@@ -1481,7 +1481,7 @@
             <a:fld id="{DA4A45B6-BEFB-425B-8601-225B4CBA19A0}" type="datetimeFigureOut">
               <a:rPr lang="en-US" smtClean="0"/>
               <a:pPr/>
-              <a:t>2/19/2011</a:t>
+              <a:t>2/20/2011</a:t>
             </a:fld>
             <a:endParaRPr lang="en-US"/>
           </a:p>
@@ -1750,7 +1750,7 @@
             <a:fld id="{DA4A45B6-BEFB-425B-8601-225B4CBA19A0}" type="datetimeFigureOut">
               <a:rPr lang="en-US" smtClean="0"/>
               <a:pPr/>
-              <a:t>2/19/2011</a:t>
+              <a:t>2/20/2011</a:t>
             </a:fld>
             <a:endParaRPr lang="en-US"/>
           </a:p>
@@ -2129,7 +2129,7 @@
             <a:fld id="{DA4A45B6-BEFB-425B-8601-225B4CBA19A0}" type="datetimeFigureOut">
               <a:rPr lang="en-US" smtClean="0"/>
               <a:pPr/>
-              <a:t>2/19/2011</a:t>
+              <a:t>2/20/2011</a:t>
             </a:fld>
             <a:endParaRPr lang="en-US"/>
           </a:p>
@@ -2256,7 +2256,7 @@
             <a:fld id="{DA4A45B6-BEFB-425B-8601-225B4CBA19A0}" type="datetimeFigureOut">
               <a:rPr lang="en-US" smtClean="0"/>
               <a:pPr/>
-              <a:t>2/19/2011</a:t>
+              <a:t>2/20/2011</a:t>
             </a:fld>
             <a:endParaRPr lang="en-US"/>
           </a:p>
@@ -2351,7 +2351,7 @@
             <a:fld id="{DA4A45B6-BEFB-425B-8601-225B4CBA19A0}" type="datetimeFigureOut">
               <a:rPr lang="en-US" smtClean="0"/>
               <a:pPr/>
-              <a:t>2/19/2011</a:t>
+              <a:t>2/20/2011</a:t>
             </a:fld>
             <a:endParaRPr lang="en-US"/>
           </a:p>
@@ -2605,7 +2605,7 @@
             <a:fld id="{DA4A45B6-BEFB-425B-8601-225B4CBA19A0}" type="datetimeFigureOut">
               <a:rPr lang="en-US" smtClean="0"/>
               <a:pPr/>
-              <a:t>2/19/2011</a:t>
+              <a:t>2/20/2011</a:t>
             </a:fld>
             <a:endParaRPr lang="en-US"/>
           </a:p>
@@ -2869,7 +2869,7 @@
             <a:fld id="{DA4A45B6-BEFB-425B-8601-225B4CBA19A0}" type="datetimeFigureOut">
               <a:rPr lang="en-US" smtClean="0"/>
               <a:pPr/>
-              <a:t>2/19/2011</a:t>
+              <a:t>2/20/2011</a:t>
             </a:fld>
             <a:endParaRPr lang="en-US"/>
           </a:p>
@@ -3278,7 +3278,7 @@
             <a:fld id="{DA4A45B6-BEFB-425B-8601-225B4CBA19A0}" type="datetimeFigureOut">
               <a:rPr lang="en-US" smtClean="0"/>
               <a:pPr/>
-              <a:t>2/19/2011</a:t>
+              <a:t>2/20/2011</a:t>
             </a:fld>
             <a:endParaRPr lang="en-US"/>
           </a:p>
@@ -3791,7 +3791,28 @@
                 </a:effectLst>
                 <a:latin typeface="Century Gothic" pitchFamily="34" charset="0"/>
               </a:rPr>
-              <a:t>MIDI-Pop</a:t>
+              <a:t>MIDI-</a:t>
+            </a:r>
+            <a:r>
+              <a:rPr lang="en-US" sz="7200" cap="none" dirty="0" err="1" smtClean="0">
+                <a:ln w="38100">
+                  <a:solidFill>
+                    <a:srgbClr val="92D050"/>
+                  </a:solidFill>
+                  <a:prstDash val="solid"/>
+                  <a:miter lim="800000"/>
+                </a:ln>
+                <a:noFill/>
+                <a:effectLst>
+                  <a:outerShdw blurRad="25500" dist="23000" dir="7020000" algn="tl">
+                    <a:srgbClr val="000000">
+                      <a:alpha val="50000"/>
+                    </a:srgbClr>
+                  </a:outerShdw>
+                </a:effectLst>
+                <a:latin typeface="Century Gothic" pitchFamily="34" charset="0"/>
+              </a:rPr>
+              <a:t>PoP</a:t>
             </a:r>
             <a:endParaRPr lang="en-US" sz="7200" cap="none" dirty="0">
               <a:ln w="38100">
@@ -4114,7 +4135,70 @@
                 </a:effectLst>
                 <a:latin typeface="Century Gothic" pitchFamily="34" charset="0"/>
               </a:rPr>
-              <a:t>MIDI-Pop Team Members</a:t>
+              <a:t>MIDI-</a:t>
+            </a:r>
+            <a:r>
+              <a:rPr lang="en-US" sz="4400" b="1" dirty="0" err="1" smtClean="0">
+                <a:ln w="19050">
+                  <a:solidFill>
+                    <a:srgbClr val="92D050"/>
+                  </a:solidFill>
+                  <a:prstDash val="solid"/>
+                  <a:miter lim="800000"/>
+                </a:ln>
+                <a:noFill/>
+                <a:effectLst>
+                  <a:outerShdw blurRad="25500" dist="23000" dir="7020000" algn="tl">
+                    <a:srgbClr val="000000">
+                      <a:alpha val="50000"/>
+                    </a:srgbClr>
+                  </a:outerShdw>
+                </a:effectLst>
+                <a:latin typeface="Century Gothic" pitchFamily="34" charset="0"/>
+              </a:rPr>
+              <a:t>PoP</a:t>
+            </a:r>
+            <a:r>
+              <a:rPr lang="en-US" sz="4400" b="1" dirty="0" smtClean="0">
+                <a:ln w="19050">
+                  <a:solidFill>
+                    <a:srgbClr val="92D050"/>
+                  </a:solidFill>
+                  <a:prstDash val="solid"/>
+                  <a:miter lim="800000"/>
+                </a:ln>
+                <a:noFill/>
+                <a:effectLst>
+                  <a:outerShdw blurRad="25500" dist="23000" dir="7020000" algn="tl">
+                    <a:srgbClr val="000000">
+                      <a:alpha val="50000"/>
+                    </a:srgbClr>
+                  </a:outerShdw>
+                </a:effectLst>
+                <a:latin typeface="Century Gothic" pitchFamily="34" charset="0"/>
+              </a:rPr>
+              <a:t> </a:t>
+            </a:r>
+            <a:r>
+              <a:rPr lang="en-US" sz="4400" b="1" dirty="0" smtClean="0">
+                <a:ln w="19050">
+                  <a:solidFill>
+                    <a:srgbClr val="92D050"/>
+                  </a:solidFill>
+                  <a:prstDash val="solid"/>
+                  <a:miter lim="800000"/>
+                </a:ln>
+                <a:noFill/>
+                <a:effectLst>
+                  <a:outerShdw blurRad="25500" dist="23000" dir="7020000" algn="tl">
+                    <a:srgbClr val="000000">
+                      <a:alpha val="50000"/>
+                    </a:srgbClr>
+                  </a:outerShdw>
+                </a:effectLst>
+                <a:latin typeface="Century Gothic" pitchFamily="34" charset="0"/>
+              </a:rPr>
+              <a:t>Team Members</a:t>
             </a:r>
             <a:endParaRPr lang="en-US" sz="4400" b="1" dirty="0">
               <a:ln w="19050">
@@ -4869,11 +4953,7 @@
           <a:p>
             <a:r>
               <a:rPr lang="en-US" sz="3200" dirty="0" smtClean="0"/>
-              <a:t>Number of tree conflicts: </a:t>
-            </a:r>
-            <a:r>
-              <a:rPr lang="en-US" sz="3200" dirty="0" smtClean="0"/>
-              <a:t>…</a:t>
+              <a:t>Number of tree conflicts: …</a:t>
             </a:r>
           </a:p>
           <a:p>
@@ -4885,13 +4965,7 @@
               <a:rPr lang="en-US" sz="3200" dirty="0" smtClean="0">
                 <a:hlinkClick r:id="rId2"/>
               </a:rPr>
-              <a:t>http://code.google.com/p/ss12-usc-2011-audiopreview2</a:t>
-            </a:r>
-            <a:r>
-              <a:rPr lang="en-US" sz="3200" dirty="0" smtClean="0">
-                <a:hlinkClick r:id="rId2"/>
-              </a:rPr>
-              <a:t>/</a:t>
+              <a:t>http://code.google.com/p/ss12-usc-2011-audiopreview2/</a:t>
             </a:r>
             <a:endParaRPr lang="en-US" sz="3200" dirty="0" smtClean="0"/>
           </a:p>

</xml_diff>

<commit_message>
updated decay factors for instruments
- Jon Sun
</commit_message>
<xml_diff>
--- a/presentation/Team MIDI-Pop.pptx
+++ b/presentation/Team MIDI-Pop.pptx
@@ -4031,13 +4031,7 @@
               <a:rPr lang="en-US" dirty="0" smtClean="0">
                 <a:latin typeface="Chaparral Pro" pitchFamily="18" charset="0"/>
               </a:rPr>
-              <a:t>“Venues </a:t>
-            </a:r>
-            <a:r>
-              <a:rPr lang="en-US" dirty="0" smtClean="0">
-                <a:latin typeface="Chaparral Pro" pitchFamily="18" charset="0"/>
-              </a:rPr>
-              <a:t>with assigned seating (i.e. concert halls) sometimes provide view simulations from a given seat to allow customers to determine which seat they’d like to buy a ticket for. However, for a person with a visual disability, the more useful information is how the venue </a:t>
+              <a:t>“Venues with assigned seating (i.e. concert halls) sometimes provide view simulations from a given seat to allow customers to determine which seat they’d like to buy a ticket for. However, for a person with a visual disability, the more useful information is how the venue </a:t>
             </a:r>
             <a:r>
               <a:rPr lang="en-US" i="1" dirty="0" smtClean="0">
@@ -4049,17 +4043,8 @@
               <a:rPr lang="en-US" dirty="0" smtClean="0">
                 <a:latin typeface="Chaparral Pro" pitchFamily="18" charset="0"/>
               </a:rPr>
-              <a:t> at that location</a:t>
-            </a:r>
-            <a:r>
-              <a:rPr lang="en-US" dirty="0" smtClean="0">
-                <a:latin typeface="Chaparral Pro" pitchFamily="18" charset="0"/>
-              </a:rPr>
-              <a:t>.”</a:t>
-            </a:r>
-            <a:endParaRPr lang="en-US" dirty="0" smtClean="0">
-              <a:latin typeface="Chaparral Pro" pitchFamily="18" charset="0"/>
-            </a:endParaRPr>
+              <a:t> at that location.”</a:t>
+            </a:r>
           </a:p>
           <a:p>
             <a:pPr>
@@ -4071,23 +4056,8 @@
               <a:rPr lang="en-US" dirty="0" smtClean="0">
                 <a:latin typeface="Chaparral Pro" pitchFamily="18" charset="0"/>
               </a:rPr>
-              <a:t>“Develop </a:t>
-            </a:r>
-            <a:r>
-              <a:rPr lang="en-US" dirty="0" smtClean="0">
-                <a:latin typeface="Chaparral Pro" pitchFamily="18" charset="0"/>
-              </a:rPr>
-              <a:t>a system that models the acoustics of a given venue and lets users hear how a clip will sound from a given seat</a:t>
-            </a:r>
-            <a:r>
-              <a:rPr lang="en-US" dirty="0" smtClean="0">
-                <a:latin typeface="Chaparral Pro" pitchFamily="18" charset="0"/>
-              </a:rPr>
-              <a:t>.”</a:t>
-            </a:r>
-            <a:endParaRPr lang="en-US" dirty="0" smtClean="0">
-              <a:latin typeface="Chaparral Pro" pitchFamily="18" charset="0"/>
-            </a:endParaRPr>
+              <a:t>“Develop a system that models the acoustics of a given venue and lets users hear how a clip will sound from a given seat.”</a:t>
+            </a:r>
           </a:p>
         </p:txBody>
       </p:sp>
@@ -5557,24 +5527,6 @@
               </a:rPr>
               <a:t>Milestones</a:t>
             </a:r>
-            <a:endParaRPr lang="en-US" sz="4400" b="1" dirty="0" smtClean="0">
-              <a:ln w="19050">
-                <a:solidFill>
-                  <a:srgbClr val="92D050"/>
-                </a:solidFill>
-                <a:prstDash val="solid"/>
-                <a:miter lim="800000"/>
-              </a:ln>
-              <a:noFill/>
-              <a:effectLst>
-                <a:outerShdw blurRad="25500" dist="23000" dir="7020000" algn="tl">
-                  <a:srgbClr val="000000">
-                    <a:alpha val="50000"/>
-                  </a:srgbClr>
-                </a:outerShdw>
-              </a:effectLst>
-              <a:latin typeface="Century Gothic" pitchFamily="34" charset="0"/>
-            </a:endParaRPr>
           </a:p>
         </p:txBody>
       </p:sp>
@@ -5588,15 +5540,15 @@
         </p:nvPicPr>
         <p:blipFill>
           <a:blip r:embed="rId2" cstate="print"/>
-          <a:srcRect/>
+          <a:srcRect t="4123"/>
           <a:stretch>
             <a:fillRect/>
           </a:stretch>
         </p:blipFill>
         <p:spPr bwMode="auto">
           <a:xfrm>
-            <a:off x="685800" y="990600"/>
-            <a:ext cx="7924800" cy="5543550"/>
+            <a:off x="685800" y="1066800"/>
+            <a:ext cx="7924800" cy="5467350"/>
           </a:xfrm>
           <a:prstGeom prst="rect">
             <a:avLst/>

</xml_diff>